<commit_message>
Caravel SoC FPGA integration
</commit_message>
<xml_diff>
--- a/labi/doc/README.pptx
+++ b/labi/doc/README.pptx
@@ -5,7 +5,14 @@
     <p:sldMasterId id="2147483648" r:id="rId1"/>
   </p:sldMasterIdLst>
   <p:sldIdLst>
-    <p:sldId id="266" r:id="rId2"/>
+    <p:sldId id="267" r:id="rId2"/>
+    <p:sldId id="260" r:id="rId3"/>
+    <p:sldId id="257" r:id="rId4"/>
+    <p:sldId id="259" r:id="rId5"/>
+    <p:sldId id="261" r:id="rId6"/>
+    <p:sldId id="262" r:id="rId7"/>
+    <p:sldId id="263" r:id="rId8"/>
+    <p:sldId id="264" r:id="rId9"/>
   </p:sldIdLst>
   <p:sldSz cx="12192000" cy="6858000"/>
   <p:notesSz cx="6858000" cy="9144000"/>
@@ -154,10 +161,9 @@
           </a:lstStyle>
           <a:p>
             <a:r>
-              <a:rPr lang="zh-TW" altLang="en-US" smtClean="0"/>
+              <a:rPr lang="zh-TW" altLang="en-US"/>
               <a:t>按一下以編輯母片標題樣式</a:t>
             </a:r>
-            <a:endParaRPr lang="zh-TW" altLang="en-US"/>
           </a:p>
         </p:txBody>
       </p:sp>
@@ -219,10 +225,9 @@
           </a:lstStyle>
           <a:p>
             <a:r>
-              <a:rPr lang="zh-TW" altLang="en-US" smtClean="0"/>
+              <a:rPr lang="zh-TW" altLang="en-US"/>
               <a:t>按一下以編輯母片副標題樣式</a:t>
             </a:r>
-            <a:endParaRPr lang="zh-TW" altLang="en-US"/>
           </a:p>
         </p:txBody>
       </p:sp>
@@ -243,7 +248,7 @@
           <a:p>
             <a:fld id="{3B5889AE-5F41-4EA9-BEE4-D65B79A71AB4}" type="datetimeFigureOut">
               <a:rPr lang="zh-TW" altLang="en-US" smtClean="0"/>
-              <a:t>2023/6/6</a:t>
+              <a:t>2023/6/29</a:t>
             </a:fld>
             <a:endParaRPr lang="zh-TW" altLang="en-US"/>
           </a:p>
@@ -337,10 +342,9 @@
           <a:lstStyle/>
           <a:p>
             <a:r>
-              <a:rPr lang="zh-TW" altLang="en-US" smtClean="0"/>
+              <a:rPr lang="zh-TW" altLang="en-US"/>
               <a:t>按一下以編輯母片標題樣式</a:t>
             </a:r>
-            <a:endParaRPr lang="zh-TW" altLang="en-US"/>
           </a:p>
         </p:txBody>
       </p:sp>
@@ -361,38 +365,37 @@
           <a:p>
             <a:pPr lvl="0"/>
             <a:r>
-              <a:rPr lang="zh-TW" altLang="en-US" smtClean="0"/>
+              <a:rPr lang="zh-TW" altLang="en-US"/>
               <a:t>編輯母片文字樣式</a:t>
             </a:r>
           </a:p>
           <a:p>
             <a:pPr lvl="1"/>
             <a:r>
-              <a:rPr lang="zh-TW" altLang="en-US" smtClean="0"/>
+              <a:rPr lang="zh-TW" altLang="en-US"/>
               <a:t>第二層</a:t>
             </a:r>
           </a:p>
           <a:p>
             <a:pPr lvl="2"/>
             <a:r>
-              <a:rPr lang="zh-TW" altLang="en-US" smtClean="0"/>
+              <a:rPr lang="zh-TW" altLang="en-US"/>
               <a:t>第三層</a:t>
             </a:r>
           </a:p>
           <a:p>
             <a:pPr lvl="3"/>
             <a:r>
-              <a:rPr lang="zh-TW" altLang="en-US" smtClean="0"/>
+              <a:rPr lang="zh-TW" altLang="en-US"/>
               <a:t>第四層</a:t>
             </a:r>
           </a:p>
           <a:p>
             <a:pPr lvl="4"/>
             <a:r>
-              <a:rPr lang="zh-TW" altLang="en-US" smtClean="0"/>
+              <a:rPr lang="zh-TW" altLang="en-US"/>
               <a:t>第五層</a:t>
             </a:r>
-            <a:endParaRPr lang="zh-TW" altLang="en-US"/>
           </a:p>
         </p:txBody>
       </p:sp>
@@ -413,7 +416,7 @@
           <a:p>
             <a:fld id="{3B5889AE-5F41-4EA9-BEE4-D65B79A71AB4}" type="datetimeFigureOut">
               <a:rPr lang="zh-TW" altLang="en-US" smtClean="0"/>
-              <a:t>2023/6/6</a:t>
+              <a:t>2023/6/29</a:t>
             </a:fld>
             <a:endParaRPr lang="zh-TW" altLang="en-US"/>
           </a:p>
@@ -512,10 +515,9 @@
           <a:lstStyle/>
           <a:p>
             <a:r>
-              <a:rPr lang="zh-TW" altLang="en-US" smtClean="0"/>
+              <a:rPr lang="zh-TW" altLang="en-US"/>
               <a:t>按一下以編輯母片標題樣式</a:t>
             </a:r>
-            <a:endParaRPr lang="zh-TW" altLang="en-US"/>
           </a:p>
         </p:txBody>
       </p:sp>
@@ -541,38 +543,37 @@
           <a:p>
             <a:pPr lvl="0"/>
             <a:r>
-              <a:rPr lang="zh-TW" altLang="en-US" smtClean="0"/>
+              <a:rPr lang="zh-TW" altLang="en-US"/>
               <a:t>編輯母片文字樣式</a:t>
             </a:r>
           </a:p>
           <a:p>
             <a:pPr lvl="1"/>
             <a:r>
-              <a:rPr lang="zh-TW" altLang="en-US" smtClean="0"/>
+              <a:rPr lang="zh-TW" altLang="en-US"/>
               <a:t>第二層</a:t>
             </a:r>
           </a:p>
           <a:p>
             <a:pPr lvl="2"/>
             <a:r>
-              <a:rPr lang="zh-TW" altLang="en-US" smtClean="0"/>
+              <a:rPr lang="zh-TW" altLang="en-US"/>
               <a:t>第三層</a:t>
             </a:r>
           </a:p>
           <a:p>
             <a:pPr lvl="3"/>
             <a:r>
-              <a:rPr lang="zh-TW" altLang="en-US" smtClean="0"/>
+              <a:rPr lang="zh-TW" altLang="en-US"/>
               <a:t>第四層</a:t>
             </a:r>
           </a:p>
           <a:p>
             <a:pPr lvl="4"/>
             <a:r>
-              <a:rPr lang="zh-TW" altLang="en-US" smtClean="0"/>
+              <a:rPr lang="zh-TW" altLang="en-US"/>
               <a:t>第五層</a:t>
             </a:r>
-            <a:endParaRPr lang="zh-TW" altLang="en-US"/>
           </a:p>
         </p:txBody>
       </p:sp>
@@ -593,7 +594,7 @@
           <a:p>
             <a:fld id="{3B5889AE-5F41-4EA9-BEE4-D65B79A71AB4}" type="datetimeFigureOut">
               <a:rPr lang="zh-TW" altLang="en-US" smtClean="0"/>
-              <a:t>2023/6/6</a:t>
+              <a:t>2023/6/29</a:t>
             </a:fld>
             <a:endParaRPr lang="zh-TW" altLang="en-US"/>
           </a:p>
@@ -687,10 +688,9 @@
           <a:lstStyle/>
           <a:p>
             <a:r>
-              <a:rPr lang="zh-TW" altLang="en-US" smtClean="0"/>
+              <a:rPr lang="zh-TW" altLang="en-US"/>
               <a:t>按一下以編輯母片標題樣式</a:t>
             </a:r>
-            <a:endParaRPr lang="zh-TW" altLang="en-US"/>
           </a:p>
         </p:txBody>
       </p:sp>
@@ -711,38 +711,37 @@
           <a:p>
             <a:pPr lvl="0"/>
             <a:r>
-              <a:rPr lang="zh-TW" altLang="en-US" smtClean="0"/>
+              <a:rPr lang="zh-TW" altLang="en-US"/>
               <a:t>編輯母片文字樣式</a:t>
             </a:r>
           </a:p>
           <a:p>
             <a:pPr lvl="1"/>
             <a:r>
-              <a:rPr lang="zh-TW" altLang="en-US" smtClean="0"/>
+              <a:rPr lang="zh-TW" altLang="en-US"/>
               <a:t>第二層</a:t>
             </a:r>
           </a:p>
           <a:p>
             <a:pPr lvl="2"/>
             <a:r>
-              <a:rPr lang="zh-TW" altLang="en-US" smtClean="0"/>
+              <a:rPr lang="zh-TW" altLang="en-US"/>
               <a:t>第三層</a:t>
             </a:r>
           </a:p>
           <a:p>
             <a:pPr lvl="3"/>
             <a:r>
-              <a:rPr lang="zh-TW" altLang="en-US" smtClean="0"/>
+              <a:rPr lang="zh-TW" altLang="en-US"/>
               <a:t>第四層</a:t>
             </a:r>
           </a:p>
           <a:p>
             <a:pPr lvl="4"/>
             <a:r>
-              <a:rPr lang="zh-TW" altLang="en-US" smtClean="0"/>
+              <a:rPr lang="zh-TW" altLang="en-US"/>
               <a:t>第五層</a:t>
             </a:r>
-            <a:endParaRPr lang="zh-TW" altLang="en-US"/>
           </a:p>
         </p:txBody>
       </p:sp>
@@ -763,7 +762,7 @@
           <a:p>
             <a:fld id="{3B5889AE-5F41-4EA9-BEE4-D65B79A71AB4}" type="datetimeFigureOut">
               <a:rPr lang="zh-TW" altLang="en-US" smtClean="0"/>
-              <a:t>2023/6/6</a:t>
+              <a:t>2023/6/29</a:t>
             </a:fld>
             <a:endParaRPr lang="zh-TW" altLang="en-US"/>
           </a:p>
@@ -866,10 +865,9 @@
           </a:lstStyle>
           <a:p>
             <a:r>
-              <a:rPr lang="zh-TW" altLang="en-US" smtClean="0"/>
+              <a:rPr lang="zh-TW" altLang="en-US"/>
               <a:t>按一下以編輯母片標題樣式</a:t>
             </a:r>
-            <a:endParaRPr lang="zh-TW" altLang="en-US"/>
           </a:p>
         </p:txBody>
       </p:sp>
@@ -986,7 +984,7 @@
           <a:p>
             <a:pPr lvl="0"/>
             <a:r>
-              <a:rPr lang="zh-TW" altLang="en-US" smtClean="0"/>
+              <a:rPr lang="zh-TW" altLang="en-US"/>
               <a:t>編輯母片文字樣式</a:t>
             </a:r>
           </a:p>
@@ -1009,7 +1007,7 @@
           <a:p>
             <a:fld id="{3B5889AE-5F41-4EA9-BEE4-D65B79A71AB4}" type="datetimeFigureOut">
               <a:rPr lang="zh-TW" altLang="en-US" smtClean="0"/>
-              <a:t>2023/6/6</a:t>
+              <a:t>2023/6/29</a:t>
             </a:fld>
             <a:endParaRPr lang="zh-TW" altLang="en-US"/>
           </a:p>
@@ -1103,10 +1101,9 @@
           <a:lstStyle/>
           <a:p>
             <a:r>
-              <a:rPr lang="zh-TW" altLang="en-US" smtClean="0"/>
+              <a:rPr lang="zh-TW" altLang="en-US"/>
               <a:t>按一下以編輯母片標題樣式</a:t>
             </a:r>
-            <a:endParaRPr lang="zh-TW" altLang="en-US"/>
           </a:p>
         </p:txBody>
       </p:sp>
@@ -1132,38 +1129,37 @@
           <a:p>
             <a:pPr lvl="0"/>
             <a:r>
-              <a:rPr lang="zh-TW" altLang="en-US" smtClean="0"/>
+              <a:rPr lang="zh-TW" altLang="en-US"/>
               <a:t>編輯母片文字樣式</a:t>
             </a:r>
           </a:p>
           <a:p>
             <a:pPr lvl="1"/>
             <a:r>
-              <a:rPr lang="zh-TW" altLang="en-US" smtClean="0"/>
+              <a:rPr lang="zh-TW" altLang="en-US"/>
               <a:t>第二層</a:t>
             </a:r>
           </a:p>
           <a:p>
             <a:pPr lvl="2"/>
             <a:r>
-              <a:rPr lang="zh-TW" altLang="en-US" smtClean="0"/>
+              <a:rPr lang="zh-TW" altLang="en-US"/>
               <a:t>第三層</a:t>
             </a:r>
           </a:p>
           <a:p>
             <a:pPr lvl="3"/>
             <a:r>
-              <a:rPr lang="zh-TW" altLang="en-US" smtClean="0"/>
+              <a:rPr lang="zh-TW" altLang="en-US"/>
               <a:t>第四層</a:t>
             </a:r>
           </a:p>
           <a:p>
             <a:pPr lvl="4"/>
             <a:r>
-              <a:rPr lang="zh-TW" altLang="en-US" smtClean="0"/>
+              <a:rPr lang="zh-TW" altLang="en-US"/>
               <a:t>第五層</a:t>
             </a:r>
-            <a:endParaRPr lang="zh-TW" altLang="en-US"/>
           </a:p>
         </p:txBody>
       </p:sp>
@@ -1189,38 +1185,37 @@
           <a:p>
             <a:pPr lvl="0"/>
             <a:r>
-              <a:rPr lang="zh-TW" altLang="en-US" smtClean="0"/>
+              <a:rPr lang="zh-TW" altLang="en-US"/>
               <a:t>編輯母片文字樣式</a:t>
             </a:r>
           </a:p>
           <a:p>
             <a:pPr lvl="1"/>
             <a:r>
-              <a:rPr lang="zh-TW" altLang="en-US" smtClean="0"/>
+              <a:rPr lang="zh-TW" altLang="en-US"/>
               <a:t>第二層</a:t>
             </a:r>
           </a:p>
           <a:p>
             <a:pPr lvl="2"/>
             <a:r>
-              <a:rPr lang="zh-TW" altLang="en-US" smtClean="0"/>
+              <a:rPr lang="zh-TW" altLang="en-US"/>
               <a:t>第三層</a:t>
             </a:r>
           </a:p>
           <a:p>
             <a:pPr lvl="3"/>
             <a:r>
-              <a:rPr lang="zh-TW" altLang="en-US" smtClean="0"/>
+              <a:rPr lang="zh-TW" altLang="en-US"/>
               <a:t>第四層</a:t>
             </a:r>
           </a:p>
           <a:p>
             <a:pPr lvl="4"/>
             <a:r>
-              <a:rPr lang="zh-TW" altLang="en-US" smtClean="0"/>
+              <a:rPr lang="zh-TW" altLang="en-US"/>
               <a:t>第五層</a:t>
             </a:r>
-            <a:endParaRPr lang="zh-TW" altLang="en-US"/>
           </a:p>
         </p:txBody>
       </p:sp>
@@ -1241,7 +1236,7 @@
           <a:p>
             <a:fld id="{3B5889AE-5F41-4EA9-BEE4-D65B79A71AB4}" type="datetimeFigureOut">
               <a:rPr lang="zh-TW" altLang="en-US" smtClean="0"/>
-              <a:t>2023/6/6</a:t>
+              <a:t>2023/6/29</a:t>
             </a:fld>
             <a:endParaRPr lang="zh-TW" altLang="en-US"/>
           </a:p>
@@ -1340,10 +1335,9 @@
           <a:lstStyle/>
           <a:p>
             <a:r>
-              <a:rPr lang="zh-TW" altLang="en-US" smtClean="0"/>
+              <a:rPr lang="zh-TW" altLang="en-US"/>
               <a:t>按一下以編輯母片標題樣式</a:t>
             </a:r>
-            <a:endParaRPr lang="zh-TW" altLang="en-US"/>
           </a:p>
         </p:txBody>
       </p:sp>
@@ -1406,7 +1400,7 @@
           <a:p>
             <a:pPr lvl="0"/>
             <a:r>
-              <a:rPr lang="zh-TW" altLang="en-US" smtClean="0"/>
+              <a:rPr lang="zh-TW" altLang="en-US"/>
               <a:t>編輯母片文字樣式</a:t>
             </a:r>
           </a:p>
@@ -1434,38 +1428,37 @@
           <a:p>
             <a:pPr lvl="0"/>
             <a:r>
-              <a:rPr lang="zh-TW" altLang="en-US" smtClean="0"/>
+              <a:rPr lang="zh-TW" altLang="en-US"/>
               <a:t>編輯母片文字樣式</a:t>
             </a:r>
           </a:p>
           <a:p>
             <a:pPr lvl="1"/>
             <a:r>
-              <a:rPr lang="zh-TW" altLang="en-US" smtClean="0"/>
+              <a:rPr lang="zh-TW" altLang="en-US"/>
               <a:t>第二層</a:t>
             </a:r>
           </a:p>
           <a:p>
             <a:pPr lvl="2"/>
             <a:r>
-              <a:rPr lang="zh-TW" altLang="en-US" smtClean="0"/>
+              <a:rPr lang="zh-TW" altLang="en-US"/>
               <a:t>第三層</a:t>
             </a:r>
           </a:p>
           <a:p>
             <a:pPr lvl="3"/>
             <a:r>
-              <a:rPr lang="zh-TW" altLang="en-US" smtClean="0"/>
+              <a:rPr lang="zh-TW" altLang="en-US"/>
               <a:t>第四層</a:t>
             </a:r>
           </a:p>
           <a:p>
             <a:pPr lvl="4"/>
             <a:r>
-              <a:rPr lang="zh-TW" altLang="en-US" smtClean="0"/>
+              <a:rPr lang="zh-TW" altLang="en-US"/>
               <a:t>第五層</a:t>
             </a:r>
-            <a:endParaRPr lang="zh-TW" altLang="en-US"/>
           </a:p>
         </p:txBody>
       </p:sp>
@@ -1528,7 +1521,7 @@
           <a:p>
             <a:pPr lvl="0"/>
             <a:r>
-              <a:rPr lang="zh-TW" altLang="en-US" smtClean="0"/>
+              <a:rPr lang="zh-TW" altLang="en-US"/>
               <a:t>編輯母片文字樣式</a:t>
             </a:r>
           </a:p>
@@ -1556,38 +1549,37 @@
           <a:p>
             <a:pPr lvl="0"/>
             <a:r>
-              <a:rPr lang="zh-TW" altLang="en-US" smtClean="0"/>
+              <a:rPr lang="zh-TW" altLang="en-US"/>
               <a:t>編輯母片文字樣式</a:t>
             </a:r>
           </a:p>
           <a:p>
             <a:pPr lvl="1"/>
             <a:r>
-              <a:rPr lang="zh-TW" altLang="en-US" smtClean="0"/>
+              <a:rPr lang="zh-TW" altLang="en-US"/>
               <a:t>第二層</a:t>
             </a:r>
           </a:p>
           <a:p>
             <a:pPr lvl="2"/>
             <a:r>
-              <a:rPr lang="zh-TW" altLang="en-US" smtClean="0"/>
+              <a:rPr lang="zh-TW" altLang="en-US"/>
               <a:t>第三層</a:t>
             </a:r>
           </a:p>
           <a:p>
             <a:pPr lvl="3"/>
             <a:r>
-              <a:rPr lang="zh-TW" altLang="en-US" smtClean="0"/>
+              <a:rPr lang="zh-TW" altLang="en-US"/>
               <a:t>第四層</a:t>
             </a:r>
           </a:p>
           <a:p>
             <a:pPr lvl="4"/>
             <a:r>
-              <a:rPr lang="zh-TW" altLang="en-US" smtClean="0"/>
+              <a:rPr lang="zh-TW" altLang="en-US"/>
               <a:t>第五層</a:t>
             </a:r>
-            <a:endParaRPr lang="zh-TW" altLang="en-US"/>
           </a:p>
         </p:txBody>
       </p:sp>
@@ -1608,7 +1600,7 @@
           <a:p>
             <a:fld id="{3B5889AE-5F41-4EA9-BEE4-D65B79A71AB4}" type="datetimeFigureOut">
               <a:rPr lang="zh-TW" altLang="en-US" smtClean="0"/>
-              <a:t>2023/6/6</a:t>
+              <a:t>2023/6/29</a:t>
             </a:fld>
             <a:endParaRPr lang="zh-TW" altLang="en-US"/>
           </a:p>
@@ -1702,10 +1694,9 @@
           <a:lstStyle/>
           <a:p>
             <a:r>
-              <a:rPr lang="zh-TW" altLang="en-US" smtClean="0"/>
+              <a:rPr lang="zh-TW" altLang="en-US"/>
               <a:t>按一下以編輯母片標題樣式</a:t>
             </a:r>
-            <a:endParaRPr lang="zh-TW" altLang="en-US"/>
           </a:p>
         </p:txBody>
       </p:sp>
@@ -1726,7 +1717,7 @@
           <a:p>
             <a:fld id="{3B5889AE-5F41-4EA9-BEE4-D65B79A71AB4}" type="datetimeFigureOut">
               <a:rPr lang="zh-TW" altLang="en-US" smtClean="0"/>
-              <a:t>2023/6/6</a:t>
+              <a:t>2023/6/29</a:t>
             </a:fld>
             <a:endParaRPr lang="zh-TW" altLang="en-US"/>
           </a:p>
@@ -1821,7 +1812,7 @@
           <a:p>
             <a:fld id="{3B5889AE-5F41-4EA9-BEE4-D65B79A71AB4}" type="datetimeFigureOut">
               <a:rPr lang="zh-TW" altLang="en-US" smtClean="0"/>
-              <a:t>2023/6/6</a:t>
+              <a:t>2023/6/29</a:t>
             </a:fld>
             <a:endParaRPr lang="zh-TW" altLang="en-US"/>
           </a:p>
@@ -1924,10 +1915,9 @@
           </a:lstStyle>
           <a:p>
             <a:r>
-              <a:rPr lang="zh-TW" altLang="en-US" smtClean="0"/>
+              <a:rPr lang="zh-TW" altLang="en-US"/>
               <a:t>按一下以編輯母片標題樣式</a:t>
             </a:r>
-            <a:endParaRPr lang="zh-TW" altLang="en-US"/>
           </a:p>
         </p:txBody>
       </p:sp>
@@ -1981,38 +1971,37 @@
           <a:p>
             <a:pPr lvl="0"/>
             <a:r>
-              <a:rPr lang="zh-TW" altLang="en-US" smtClean="0"/>
+              <a:rPr lang="zh-TW" altLang="en-US"/>
               <a:t>編輯母片文字樣式</a:t>
             </a:r>
           </a:p>
           <a:p>
             <a:pPr lvl="1"/>
             <a:r>
-              <a:rPr lang="zh-TW" altLang="en-US" smtClean="0"/>
+              <a:rPr lang="zh-TW" altLang="en-US"/>
               <a:t>第二層</a:t>
             </a:r>
           </a:p>
           <a:p>
             <a:pPr lvl="2"/>
             <a:r>
-              <a:rPr lang="zh-TW" altLang="en-US" smtClean="0"/>
+              <a:rPr lang="zh-TW" altLang="en-US"/>
               <a:t>第三層</a:t>
             </a:r>
           </a:p>
           <a:p>
             <a:pPr lvl="3"/>
             <a:r>
-              <a:rPr lang="zh-TW" altLang="en-US" smtClean="0"/>
+              <a:rPr lang="zh-TW" altLang="en-US"/>
               <a:t>第四層</a:t>
             </a:r>
           </a:p>
           <a:p>
             <a:pPr lvl="4"/>
             <a:r>
-              <a:rPr lang="zh-TW" altLang="en-US" smtClean="0"/>
+              <a:rPr lang="zh-TW" altLang="en-US"/>
               <a:t>第五層</a:t>
             </a:r>
-            <a:endParaRPr lang="zh-TW" altLang="en-US"/>
           </a:p>
         </p:txBody>
       </p:sp>
@@ -2075,7 +2064,7 @@
           <a:p>
             <a:pPr lvl="0"/>
             <a:r>
-              <a:rPr lang="zh-TW" altLang="en-US" smtClean="0"/>
+              <a:rPr lang="zh-TW" altLang="en-US"/>
               <a:t>編輯母片文字樣式</a:t>
             </a:r>
           </a:p>
@@ -2098,7 +2087,7 @@
           <a:p>
             <a:fld id="{3B5889AE-5F41-4EA9-BEE4-D65B79A71AB4}" type="datetimeFigureOut">
               <a:rPr lang="zh-TW" altLang="en-US" smtClean="0"/>
-              <a:t>2023/6/6</a:t>
+              <a:t>2023/6/29</a:t>
             </a:fld>
             <a:endParaRPr lang="zh-TW" altLang="en-US"/>
           </a:p>
@@ -2201,10 +2190,9 @@
           </a:lstStyle>
           <a:p>
             <a:r>
-              <a:rPr lang="zh-TW" altLang="en-US" smtClean="0"/>
+              <a:rPr lang="zh-TW" altLang="en-US"/>
               <a:t>按一下以編輯母片標題樣式</a:t>
             </a:r>
-            <a:endParaRPr lang="zh-TW" altLang="en-US"/>
           </a:p>
         </p:txBody>
       </p:sp>
@@ -2328,7 +2316,7 @@
           <a:p>
             <a:pPr lvl="0"/>
             <a:r>
-              <a:rPr lang="zh-TW" altLang="en-US" smtClean="0"/>
+              <a:rPr lang="zh-TW" altLang="en-US"/>
               <a:t>編輯母片文字樣式</a:t>
             </a:r>
           </a:p>
@@ -2351,7 +2339,7 @@
           <a:p>
             <a:fld id="{3B5889AE-5F41-4EA9-BEE4-D65B79A71AB4}" type="datetimeFigureOut">
               <a:rPr lang="zh-TW" altLang="en-US" smtClean="0"/>
-              <a:t>2023/6/6</a:t>
+              <a:t>2023/6/29</a:t>
             </a:fld>
             <a:endParaRPr lang="zh-TW" altLang="en-US"/>
           </a:p>
@@ -2460,10 +2448,9 @@
           <a:lstStyle/>
           <a:p>
             <a:r>
-              <a:rPr lang="zh-TW" altLang="en-US" smtClean="0"/>
+              <a:rPr lang="zh-TW" altLang="en-US"/>
               <a:t>按一下以編輯母片標題樣式</a:t>
             </a:r>
-            <a:endParaRPr lang="zh-TW" altLang="en-US"/>
           </a:p>
         </p:txBody>
       </p:sp>
@@ -2494,38 +2481,37 @@
           <a:p>
             <a:pPr lvl="0"/>
             <a:r>
-              <a:rPr lang="zh-TW" altLang="en-US" smtClean="0"/>
+              <a:rPr lang="zh-TW" altLang="en-US"/>
               <a:t>編輯母片文字樣式</a:t>
             </a:r>
           </a:p>
           <a:p>
             <a:pPr lvl="1"/>
             <a:r>
-              <a:rPr lang="zh-TW" altLang="en-US" smtClean="0"/>
+              <a:rPr lang="zh-TW" altLang="en-US"/>
               <a:t>第二層</a:t>
             </a:r>
           </a:p>
           <a:p>
             <a:pPr lvl="2"/>
             <a:r>
-              <a:rPr lang="zh-TW" altLang="en-US" smtClean="0"/>
+              <a:rPr lang="zh-TW" altLang="en-US"/>
               <a:t>第三層</a:t>
             </a:r>
           </a:p>
           <a:p>
             <a:pPr lvl="3"/>
             <a:r>
-              <a:rPr lang="zh-TW" altLang="en-US" smtClean="0"/>
+              <a:rPr lang="zh-TW" altLang="en-US"/>
               <a:t>第四層</a:t>
             </a:r>
           </a:p>
           <a:p>
             <a:pPr lvl="4"/>
             <a:r>
-              <a:rPr lang="zh-TW" altLang="en-US" smtClean="0"/>
+              <a:rPr lang="zh-TW" altLang="en-US"/>
               <a:t>第五層</a:t>
             </a:r>
-            <a:endParaRPr lang="zh-TW" altLang="en-US"/>
           </a:p>
         </p:txBody>
       </p:sp>
@@ -2564,7 +2550,7 @@
           <a:p>
             <a:fld id="{3B5889AE-5F41-4EA9-BEE4-D65B79A71AB4}" type="datetimeFigureOut">
               <a:rPr lang="zh-TW" altLang="en-US" smtClean="0"/>
-              <a:t>2023/6/6</a:t>
+              <a:t>2023/6/29</a:t>
             </a:fld>
             <a:endParaRPr lang="zh-TW" altLang="en-US"/>
           </a:p>
@@ -2985,8 +2971,8 @@
           <a:lstStyle/>
           <a:p>
             <a:r>
-              <a:rPr lang="en-US" altLang="zh-TW" dirty="0" smtClean="0"/>
-              <a:t>Caravel_FPGA_0_4</a:t>
+              <a:rPr lang="en-US" altLang="zh-TW" dirty="0"/>
+              <a:t>Folder Structure</a:t>
             </a:r>
             <a:endParaRPr lang="zh-TW" altLang="en-US" dirty="0"/>
           </a:p>
@@ -3003,6 +2989,287 @@
           </p:nvPr>
         </p:nvSpPr>
         <p:spPr/>
+        <p:txBody>
+          <a:bodyPr>
+            <a:normAutofit lnSpcReduction="10000"/>
+          </a:bodyPr>
+          <a:lstStyle/>
+          <a:p>
+            <a:r>
+              <a:rPr lang="en-US" altLang="zh-TW" dirty="0"/>
+              <a:t>Project</a:t>
+            </a:r>
+          </a:p>
+          <a:p>
+            <a:pPr lvl="1"/>
+            <a:r>
+              <a:rPr lang="en-US" altLang="zh-TW" dirty="0" err="1"/>
+              <a:t>jupyer_notebook_project</a:t>
+            </a:r>
+            <a:endParaRPr lang="en-US" altLang="zh-TW" dirty="0"/>
+          </a:p>
+          <a:p>
+            <a:pPr lvl="2"/>
+            <a:r>
+              <a:rPr lang="en-US" altLang="zh-TW" dirty="0"/>
+              <a:t>Includes </a:t>
+            </a:r>
+            <a:r>
+              <a:rPr lang="en-US" altLang="zh-TW" dirty="0" err="1"/>
+              <a:t>bitstream</a:t>
+            </a:r>
+            <a:r>
+              <a:rPr lang="en-US" altLang="zh-TW" dirty="0"/>
+              <a:t>, firmware, and python code.</a:t>
+            </a:r>
+          </a:p>
+          <a:p>
+            <a:pPr lvl="1"/>
+            <a:r>
+              <a:rPr lang="en-US" altLang="zh-TW" dirty="0" err="1"/>
+              <a:t>vitis_hls_project</a:t>
+            </a:r>
+            <a:endParaRPr lang="en-US" altLang="zh-TW" dirty="0"/>
+          </a:p>
+          <a:p>
+            <a:pPr lvl="2"/>
+            <a:r>
+              <a:rPr lang="en-US" altLang="zh-TW" dirty="0"/>
+              <a:t>All </a:t>
+            </a:r>
+            <a:r>
+              <a:rPr lang="en-US" altLang="zh-TW" dirty="0" err="1"/>
+              <a:t>vitis</a:t>
+            </a:r>
+            <a:r>
+              <a:rPr lang="en-US" altLang="zh-TW" dirty="0"/>
+              <a:t> source code (lab 1, lab 3 and </a:t>
+            </a:r>
+            <a:r>
+              <a:rPr lang="en-US" altLang="zh-TW" dirty="0" err="1"/>
+              <a:t>outputpin</a:t>
+            </a:r>
+            <a:r>
+              <a:rPr lang="en-US" altLang="zh-TW" dirty="0"/>
+              <a:t> IP) are included. Use run_vitis.sh to build the HLS project and export to IP separately.</a:t>
+            </a:r>
+          </a:p>
+          <a:p>
+            <a:pPr lvl="1"/>
+            <a:r>
+              <a:rPr lang="en-US" altLang="zh-TW" dirty="0" err="1"/>
+              <a:t>vvd_srcs</a:t>
+            </a:r>
+            <a:endParaRPr lang="en-US" altLang="zh-TW" dirty="0"/>
+          </a:p>
+          <a:p>
+            <a:pPr lvl="2"/>
+            <a:r>
+              <a:rPr lang="en-US" altLang="zh-TW" dirty="0"/>
+              <a:t>Includes Caravel-SOC source code, </a:t>
+            </a:r>
+            <a:r>
+              <a:rPr lang="en-US" altLang="zh-TW" dirty="0" err="1"/>
+              <a:t>testbench</a:t>
+            </a:r>
+            <a:r>
+              <a:rPr lang="en-US" altLang="zh-TW" dirty="0"/>
+              <a:t> related code.</a:t>
+            </a:r>
+            <a:br>
+              <a:rPr lang="en-US" altLang="zh-TW" dirty="0"/>
+            </a:br>
+            <a:r>
+              <a:rPr lang="en-US" altLang="zh-TW" dirty="0"/>
+              <a:t>Note: Some source codes are modified for the Caravel-FPGA project.</a:t>
+            </a:r>
+          </a:p>
+          <a:p>
+            <a:pPr lvl="1"/>
+            <a:r>
+              <a:rPr lang="en-US" altLang="zh-TW" dirty="0">
+                <a:solidFill>
+                  <a:srgbClr val="FF0000"/>
+                </a:solidFill>
+              </a:rPr>
+              <a:t>run_vitis.sh</a:t>
+            </a:r>
+          </a:p>
+          <a:p>
+            <a:pPr lvl="1"/>
+            <a:r>
+              <a:rPr lang="en-US" altLang="zh-TW" dirty="0">
+                <a:solidFill>
+                  <a:srgbClr val="FF0000"/>
+                </a:solidFill>
+              </a:rPr>
+              <a:t>run_vivado.sh</a:t>
+            </a:r>
+          </a:p>
+          <a:p>
+            <a:pPr lvl="1"/>
+            <a:r>
+              <a:rPr lang="en-US" altLang="zh-TW" dirty="0" err="1"/>
+              <a:t>vvd_caravel_fpga.tcl</a:t>
+            </a:r>
+            <a:endParaRPr lang="en-US" altLang="zh-TW" dirty="0"/>
+          </a:p>
+        </p:txBody>
+      </p:sp>
+    </p:spTree>
+    <p:extLst>
+      <p:ext uri="{BB962C8B-B14F-4D97-AF65-F5344CB8AC3E}">
+        <p14:creationId xmlns:p14="http://schemas.microsoft.com/office/powerpoint/2010/main" val="505996655"/>
+      </p:ext>
+    </p:extLst>
+  </p:cSld>
+  <p:clrMapOvr>
+    <a:masterClrMapping/>
+  </p:clrMapOvr>
+</p:sld>
+</file>
+
+<file path=ppt/slides/slide2.xml><?xml version="1.0" encoding="utf-8"?>
+<p:sld xmlns:a="http://schemas.openxmlformats.org/drawingml/2006/main" xmlns:r="http://schemas.openxmlformats.org/officeDocument/2006/relationships" xmlns:p="http://schemas.openxmlformats.org/presentationml/2006/main">
+  <p:cSld>
+    <p:spTree>
+      <p:nvGrpSpPr>
+        <p:cNvPr id="1" name=""/>
+        <p:cNvGrpSpPr/>
+        <p:nvPr/>
+      </p:nvGrpSpPr>
+      <p:grpSpPr>
+        <a:xfrm>
+          <a:off x="0" y="0"/>
+          <a:ext cx="0" cy="0"/>
+          <a:chOff x="0" y="0"/>
+          <a:chExt cx="0" cy="0"/>
+        </a:xfrm>
+      </p:grpSpPr>
+      <p:sp>
+        <p:nvSpPr>
+          <p:cNvPr id="2" name="標題 1"/>
+          <p:cNvSpPr>
+            <a:spLocks noGrp="1"/>
+          </p:cNvSpPr>
+          <p:nvPr>
+            <p:ph type="title"/>
+          </p:nvPr>
+        </p:nvSpPr>
+        <p:spPr/>
+        <p:txBody>
+          <a:bodyPr/>
+          <a:lstStyle/>
+          <a:p>
+            <a:r>
+              <a:rPr lang="en-US" altLang="zh-TW" dirty="0"/>
+              <a:t>Build Environment</a:t>
+            </a:r>
+            <a:endParaRPr lang="zh-TW" altLang="en-US" dirty="0"/>
+          </a:p>
+        </p:txBody>
+      </p:sp>
+      <p:sp>
+        <p:nvSpPr>
+          <p:cNvPr id="3" name="內容版面配置區 2"/>
+          <p:cNvSpPr>
+            <a:spLocks noGrp="1"/>
+          </p:cNvSpPr>
+          <p:nvPr>
+            <p:ph idx="1"/>
+          </p:nvPr>
+        </p:nvSpPr>
+        <p:spPr/>
+        <p:txBody>
+          <a:bodyPr/>
+          <a:lstStyle/>
+          <a:p>
+            <a:r>
+              <a:rPr lang="en-US" altLang="zh-TW" dirty="0"/>
+              <a:t>OS: Ubuntu 20.4.6 LTS 64bit</a:t>
+            </a:r>
+          </a:p>
+          <a:p>
+            <a:r>
+              <a:rPr lang="en-US" altLang="zh-TW" dirty="0" err="1"/>
+              <a:t>Vivado</a:t>
+            </a:r>
+            <a:r>
+              <a:rPr lang="en-US" altLang="zh-TW" dirty="0"/>
+              <a:t> version: 2022.1</a:t>
+            </a:r>
+          </a:p>
+        </p:txBody>
+      </p:sp>
+    </p:spTree>
+    <p:extLst>
+      <p:ext uri="{BB962C8B-B14F-4D97-AF65-F5344CB8AC3E}">
+        <p14:creationId xmlns:p14="http://schemas.microsoft.com/office/powerpoint/2010/main" val="3499900456"/>
+      </p:ext>
+    </p:extLst>
+  </p:cSld>
+  <p:clrMapOvr>
+    <a:masterClrMapping/>
+  </p:clrMapOvr>
+</p:sld>
+</file>
+
+<file path=ppt/slides/slide3.xml><?xml version="1.0" encoding="utf-8"?>
+<p:sld xmlns:a="http://schemas.openxmlformats.org/drawingml/2006/main" xmlns:r="http://schemas.openxmlformats.org/officeDocument/2006/relationships" xmlns:p="http://schemas.openxmlformats.org/presentationml/2006/main">
+  <p:cSld>
+    <p:spTree>
+      <p:nvGrpSpPr>
+        <p:cNvPr id="1" name=""/>
+        <p:cNvGrpSpPr/>
+        <p:nvPr/>
+      </p:nvGrpSpPr>
+      <p:grpSpPr>
+        <a:xfrm>
+          <a:off x="0" y="0"/>
+          <a:ext cx="0" cy="0"/>
+          <a:chOff x="0" y="0"/>
+          <a:chExt cx="0" cy="0"/>
+        </a:xfrm>
+      </p:grpSpPr>
+      <p:sp>
+        <p:nvSpPr>
+          <p:cNvPr id="2" name="標題 1"/>
+          <p:cNvSpPr>
+            <a:spLocks noGrp="1"/>
+          </p:cNvSpPr>
+          <p:nvPr>
+            <p:ph type="title"/>
+          </p:nvPr>
+        </p:nvSpPr>
+        <p:spPr/>
+        <p:txBody>
+          <a:bodyPr/>
+          <a:lstStyle/>
+          <a:p>
+            <a:r>
+              <a:rPr lang="en-US" altLang="zh-TW" dirty="0"/>
+              <a:t>Built Steps</a:t>
+            </a:r>
+            <a:endParaRPr lang="zh-TW" altLang="en-US" dirty="0"/>
+          </a:p>
+        </p:txBody>
+      </p:sp>
+      <p:sp>
+        <p:nvSpPr>
+          <p:cNvPr id="3" name="內容版面配置區 2"/>
+          <p:cNvSpPr>
+            <a:spLocks noGrp="1"/>
+          </p:cNvSpPr>
+          <p:nvPr>
+            <p:ph idx="1"/>
+          </p:nvPr>
+        </p:nvSpPr>
+        <p:spPr>
+          <a:xfrm>
+            <a:off x="838200" y="1825625"/>
+            <a:ext cx="10934700" cy="4821360"/>
+          </a:xfrm>
+        </p:spPr>
         <p:txBody>
           <a:bodyPr>
             <a:normAutofit/>
@@ -3010,47 +3277,1167 @@
           <a:lstStyle/>
           <a:p>
             <a:r>
-              <a:rPr lang="en-US" altLang="zh-TW" dirty="0" smtClean="0"/>
-              <a:t>Update note:</a:t>
-            </a:r>
-          </a:p>
-          <a:p>
-            <a:pPr marL="914400" lvl="1" indent="-457200">
-              <a:buFont typeface="+mj-lt"/>
-              <a:buAutoNum type="arabicPeriod"/>
-            </a:pPr>
-            <a:r>
-              <a:rPr lang="en-US" altLang="zh-TW" dirty="0" smtClean="0"/>
-              <a:t>Remove </a:t>
+              <a:rPr lang="en-US" altLang="zh-TW" dirty="0"/>
+              <a:t>Run bash </a:t>
+            </a:r>
+            <a:r>
+              <a:rPr lang="en-US" altLang="zh-TW" dirty="0">
+                <a:solidFill>
+                  <a:srgbClr val="FF0000"/>
+                </a:solidFill>
+              </a:rPr>
+              <a:t>run_vitis.sh </a:t>
+            </a:r>
+            <a:r>
+              <a:rPr lang="en-US" altLang="zh-TW" dirty="0"/>
+              <a:t>the whole all </a:t>
             </a:r>
             <a:r>
               <a:rPr lang="en-US" altLang="zh-TW" dirty="0" err="1"/>
-              <a:t>Jupyter</a:t>
-            </a:r>
-            <a:r>
-              <a:rPr lang="en-US" altLang="zh-TW" dirty="0"/>
-              <a:t> </a:t>
-            </a:r>
-            <a:r>
-              <a:rPr lang="en-US" altLang="zh-TW" dirty="0" smtClean="0"/>
-              <a:t>Notebook python code about dummy buffer allocation. </a:t>
-            </a:r>
-            <a:endParaRPr lang="en-US" altLang="zh-TW" dirty="0" smtClean="0"/>
-          </a:p>
-          <a:p>
-            <a:pPr lvl="2"/>
-            <a:r>
-              <a:rPr lang="en-US" altLang="zh-TW" sz="1800" dirty="0" err="1"/>
-              <a:t>caravel_fpga.ipynb</a:t>
-            </a:r>
-            <a:endParaRPr lang="en-US" altLang="zh-TW" sz="1800" dirty="0" smtClean="0"/>
+              <a:t>hls</a:t>
+            </a:r>
+            <a:r>
+              <a:rPr lang="en-US" altLang="zh-TW" dirty="0"/>
+              <a:t> projects will build up and export IP automatically.</a:t>
+            </a:r>
+          </a:p>
+          <a:p>
+            <a:pPr lvl="1"/>
+            <a:r>
+              <a:rPr lang="en-US" altLang="zh-TW" dirty="0"/>
+              <a:t>Create </a:t>
+            </a:r>
+            <a:r>
+              <a:rPr lang="en-US" altLang="zh-TW" b="1" dirty="0" err="1"/>
+              <a:t>hls_caravel_ps.prj</a:t>
+            </a:r>
+            <a:r>
+              <a:rPr lang="en-US" altLang="zh-TW" b="1" dirty="0"/>
+              <a:t>, </a:t>
+            </a:r>
+            <a:r>
+              <a:rPr lang="en-US" altLang="zh-TW" b="1" dirty="0" err="1"/>
+              <a:t>hls_output_pin.prj</a:t>
+            </a:r>
+            <a:r>
+              <a:rPr lang="en-US" altLang="zh-TW" b="1" dirty="0"/>
+              <a:t>, and </a:t>
+            </a:r>
+            <a:r>
+              <a:rPr lang="en-US" altLang="zh-TW" b="1" dirty="0" err="1"/>
+              <a:t>hls_read_romcode.prj</a:t>
+            </a:r>
+            <a:endParaRPr lang="en-US" altLang="zh-TW" b="1" dirty="0"/>
+          </a:p>
+          <a:p>
+            <a:r>
+              <a:rPr lang="en-US" altLang="zh-TW" dirty="0"/>
+              <a:t>Run bash </a:t>
+            </a:r>
+            <a:r>
+              <a:rPr lang="en-US" altLang="zh-TW" dirty="0">
+                <a:solidFill>
+                  <a:srgbClr val="FF0000"/>
+                </a:solidFill>
+              </a:rPr>
+              <a:t>run_vivado.sh </a:t>
+            </a:r>
+            <a:r>
+              <a:rPr lang="en-US" altLang="zh-TW" dirty="0"/>
+              <a:t>to build up </a:t>
+            </a:r>
+            <a:r>
+              <a:rPr lang="en-US" altLang="zh-TW" dirty="0" err="1"/>
+              <a:t>vivado</a:t>
+            </a:r>
+            <a:r>
+              <a:rPr lang="en-US" altLang="zh-TW" dirty="0"/>
+              <a:t> project for Caravel-FPGA and execute “</a:t>
+            </a:r>
+            <a:r>
+              <a:rPr lang="en-US" altLang="zh-TW" dirty="0" err="1"/>
+              <a:t>write_bitstream</a:t>
+            </a:r>
+            <a:r>
+              <a:rPr lang="en-US" altLang="zh-TW" dirty="0"/>
+              <a:t>” step to generate </a:t>
+            </a:r>
+            <a:r>
+              <a:rPr lang="en-US" altLang="zh-TW" dirty="0" err="1"/>
+              <a:t>bitstream</a:t>
+            </a:r>
+            <a:r>
+              <a:rPr lang="en-US" altLang="zh-TW" dirty="0"/>
+              <a:t>.</a:t>
+            </a:r>
+          </a:p>
+          <a:p>
+            <a:pPr lvl="1"/>
+            <a:r>
+              <a:rPr lang="en-US" altLang="zh-TW" dirty="0"/>
+              <a:t>Create </a:t>
+            </a:r>
+            <a:r>
+              <a:rPr lang="en-US" altLang="zh-TW" b="1" dirty="0" err="1"/>
+              <a:t>vvd_caravel_fpga</a:t>
+            </a:r>
+            <a:endParaRPr lang="en-US" altLang="zh-TW" b="1" dirty="0"/>
+          </a:p>
+          <a:p>
+            <a:pPr lvl="1"/>
+            <a:r>
+              <a:rPr lang="en-US" altLang="zh-TW" dirty="0"/>
+              <a:t>Run_vivado.sh =&gt; User project counter with </a:t>
+            </a:r>
+            <a:r>
+              <a:rPr lang="en-US" altLang="zh-TW" dirty="0" err="1"/>
+              <a:t>clk</a:t>
+            </a:r>
+            <a:r>
+              <a:rPr lang="en-US" altLang="zh-TW" dirty="0"/>
+              <a:t> 50M</a:t>
+            </a:r>
+          </a:p>
+          <a:p>
+            <a:pPr lvl="1"/>
+            <a:r>
+              <a:rPr lang="en-US" altLang="zh-TW" dirty="0"/>
+              <a:t>Run_vivado_gcd.sh =&gt; User project </a:t>
+            </a:r>
+            <a:r>
+              <a:rPr lang="en-US" altLang="zh-TW" dirty="0" err="1"/>
+              <a:t>gcd</a:t>
+            </a:r>
+            <a:r>
+              <a:rPr lang="en-US" altLang="zh-TW" dirty="0"/>
+              <a:t> with </a:t>
+            </a:r>
+            <a:r>
+              <a:rPr lang="en-US" altLang="zh-TW" dirty="0" err="1"/>
+              <a:t>clk</a:t>
+            </a:r>
+            <a:r>
+              <a:rPr lang="en-US" altLang="zh-TW" dirty="0"/>
+              <a:t> 10M</a:t>
+            </a:r>
+          </a:p>
+          <a:p>
+            <a:r>
+              <a:rPr lang="en-US" altLang="zh-TW" dirty="0"/>
+              <a:t>The </a:t>
+            </a:r>
+            <a:r>
+              <a:rPr lang="en-US" altLang="zh-TW" b="1" dirty="0" err="1"/>
+              <a:t>caravel_fpga.bit</a:t>
+            </a:r>
+            <a:r>
+              <a:rPr lang="en-US" altLang="zh-TW" dirty="0"/>
+              <a:t> and </a:t>
+            </a:r>
+            <a:r>
+              <a:rPr lang="en-US" altLang="zh-TW" b="1" dirty="0" err="1"/>
+              <a:t>caravel_fpga.hwh</a:t>
+            </a:r>
+            <a:r>
+              <a:rPr lang="en-US" altLang="zh-TW" dirty="0"/>
+              <a:t> will be copy to folder: </a:t>
+            </a:r>
+            <a:r>
+              <a:rPr lang="en-US" altLang="zh-TW" dirty="0" err="1"/>
+              <a:t>jupyter_notebooks_project</a:t>
+            </a:r>
+            <a:endParaRPr lang="en-US" altLang="zh-TW" dirty="0"/>
+          </a:p>
+          <a:p>
+            <a:r>
+              <a:rPr lang="en-US" altLang="zh-TW" dirty="0"/>
+              <a:t>Upload all files include in </a:t>
+            </a:r>
+            <a:r>
+              <a:rPr lang="en-US" altLang="zh-TW" dirty="0" err="1"/>
+              <a:t>jupyter_notebooks_project</a:t>
+            </a:r>
+            <a:r>
+              <a:rPr lang="en-US" altLang="zh-TW" dirty="0"/>
+              <a:t> to pynq-z2 board</a:t>
+            </a:r>
           </a:p>
         </p:txBody>
       </p:sp>
     </p:spTree>
     <p:extLst>
       <p:ext uri="{BB962C8B-B14F-4D97-AF65-F5344CB8AC3E}">
-        <p14:creationId xmlns:p14="http://schemas.microsoft.com/office/powerpoint/2010/main" val="1665208266"/>
+        <p14:creationId xmlns:p14="http://schemas.microsoft.com/office/powerpoint/2010/main" val="1376590813"/>
+      </p:ext>
+    </p:extLst>
+  </p:cSld>
+  <p:clrMapOvr>
+    <a:masterClrMapping/>
+  </p:clrMapOvr>
+</p:sld>
+</file>
+
+<file path=ppt/slides/slide4.xml><?xml version="1.0" encoding="utf-8"?>
+<p:sld xmlns:a="http://schemas.openxmlformats.org/drawingml/2006/main" xmlns:r="http://schemas.openxmlformats.org/officeDocument/2006/relationships" xmlns:p="http://schemas.openxmlformats.org/presentationml/2006/main">
+  <p:cSld>
+    <p:spTree>
+      <p:nvGrpSpPr>
+        <p:cNvPr id="1" name=""/>
+        <p:cNvGrpSpPr/>
+        <p:nvPr/>
+      </p:nvGrpSpPr>
+      <p:grpSpPr>
+        <a:xfrm>
+          <a:off x="0" y="0"/>
+          <a:ext cx="0" cy="0"/>
+          <a:chOff x="0" y="0"/>
+          <a:chExt cx="0" cy="0"/>
+        </a:xfrm>
+      </p:grpSpPr>
+      <p:sp>
+        <p:nvSpPr>
+          <p:cNvPr id="2" name="標題 1"/>
+          <p:cNvSpPr>
+            <a:spLocks noGrp="1"/>
+          </p:cNvSpPr>
+          <p:nvPr>
+            <p:ph type="title"/>
+          </p:nvPr>
+        </p:nvSpPr>
+        <p:spPr/>
+        <p:txBody>
+          <a:bodyPr/>
+          <a:lstStyle/>
+          <a:p>
+            <a:r>
+              <a:rPr lang="en-US" altLang="zh-TW" dirty="0"/>
+              <a:t>Run Simulation</a:t>
+            </a:r>
+            <a:r>
+              <a:rPr lang="zh-TW" altLang="en-US" dirty="0"/>
+              <a:t> </a:t>
+            </a:r>
+            <a:r>
+              <a:rPr lang="en-US" altLang="zh-TW" dirty="0"/>
+              <a:t>in </a:t>
+            </a:r>
+            <a:r>
+              <a:rPr lang="en-US" altLang="zh-TW" dirty="0" err="1"/>
+              <a:t>Vivado</a:t>
+            </a:r>
+            <a:r>
+              <a:rPr lang="en-US" altLang="zh-TW" dirty="0"/>
+              <a:t> GUI</a:t>
+            </a:r>
+            <a:endParaRPr lang="zh-TW" altLang="en-US" dirty="0"/>
+          </a:p>
+        </p:txBody>
+      </p:sp>
+      <p:sp>
+        <p:nvSpPr>
+          <p:cNvPr id="3" name="內容版面配置區 2"/>
+          <p:cNvSpPr>
+            <a:spLocks noGrp="1"/>
+          </p:cNvSpPr>
+          <p:nvPr>
+            <p:ph idx="1"/>
+          </p:nvPr>
+        </p:nvSpPr>
+        <p:spPr/>
+        <p:txBody>
+          <a:bodyPr/>
+          <a:lstStyle/>
+          <a:p>
+            <a:r>
+              <a:rPr lang="en-US" altLang="zh-TW" dirty="0"/>
+              <a:t>Open </a:t>
+            </a:r>
+            <a:r>
+              <a:rPr lang="en-US" altLang="zh-TW" dirty="0" err="1"/>
+              <a:t>Vivado</a:t>
+            </a:r>
+            <a:r>
+              <a:rPr lang="en-US" altLang="zh-TW" dirty="0"/>
+              <a:t> project: </a:t>
+            </a:r>
+            <a:r>
+              <a:rPr lang="en-US" altLang="zh-TW" dirty="0" err="1"/>
+              <a:t>vvd_caravel_fpga</a:t>
+            </a:r>
+            <a:r>
+              <a:rPr lang="en-US" altLang="zh-TW" dirty="0"/>
+              <a:t> </a:t>
+            </a:r>
+          </a:p>
+          <a:p>
+            <a:r>
+              <a:rPr lang="en-US" altLang="zh-TW" dirty="0"/>
+              <a:t>Right click on the “SIMULATION” and select </a:t>
+            </a:r>
+            <a:br>
+              <a:rPr lang="en-US" altLang="zh-TW" dirty="0"/>
+            </a:br>
+            <a:r>
+              <a:rPr lang="en-US" altLang="zh-TW" dirty="0"/>
+              <a:t>Simulation Setting</a:t>
+            </a:r>
+          </a:p>
+          <a:p>
+            <a:pPr marL="0" indent="0">
+              <a:buNone/>
+            </a:pPr>
+            <a:endParaRPr lang="en-US" altLang="zh-TW" dirty="0"/>
+          </a:p>
+          <a:p>
+            <a:pPr marL="0" indent="0">
+              <a:buNone/>
+            </a:pPr>
+            <a:endParaRPr lang="en-US" altLang="zh-TW" dirty="0"/>
+          </a:p>
+          <a:p>
+            <a:endParaRPr lang="zh-TW" altLang="en-US" dirty="0"/>
+          </a:p>
+        </p:txBody>
+      </p:sp>
+      <p:pic>
+        <p:nvPicPr>
+          <p:cNvPr id="4" name="圖片 3"/>
+          <p:cNvPicPr>
+            <a:picLocks noChangeAspect="1"/>
+          </p:cNvPicPr>
+          <p:nvPr/>
+        </p:nvPicPr>
+        <p:blipFill>
+          <a:blip r:embed="rId2"/>
+          <a:stretch>
+            <a:fillRect/>
+          </a:stretch>
+        </p:blipFill>
+        <p:spPr>
+          <a:xfrm>
+            <a:off x="8270101" y="1027906"/>
+            <a:ext cx="2333951" cy="2286319"/>
+          </a:xfrm>
+          <a:prstGeom prst="rect">
+            <a:avLst/>
+          </a:prstGeom>
+        </p:spPr>
+      </p:pic>
+      <p:pic>
+        <p:nvPicPr>
+          <p:cNvPr id="5" name="圖片 4"/>
+          <p:cNvPicPr>
+            <a:picLocks noChangeAspect="1"/>
+          </p:cNvPicPr>
+          <p:nvPr/>
+        </p:nvPicPr>
+        <p:blipFill>
+          <a:blip r:embed="rId3"/>
+          <a:stretch>
+            <a:fillRect/>
+          </a:stretch>
+        </p:blipFill>
+        <p:spPr>
+          <a:xfrm>
+            <a:off x="7612019" y="3977006"/>
+            <a:ext cx="4124901" cy="1876687"/>
+          </a:xfrm>
+          <a:prstGeom prst="rect">
+            <a:avLst/>
+          </a:prstGeom>
+        </p:spPr>
+      </p:pic>
+    </p:spTree>
+    <p:extLst>
+      <p:ext uri="{BB962C8B-B14F-4D97-AF65-F5344CB8AC3E}">
+        <p14:creationId xmlns:p14="http://schemas.microsoft.com/office/powerpoint/2010/main" val="770590093"/>
+      </p:ext>
+    </p:extLst>
+  </p:cSld>
+  <p:clrMapOvr>
+    <a:masterClrMapping/>
+  </p:clrMapOvr>
+</p:sld>
+</file>
+
+<file path=ppt/slides/slide5.xml><?xml version="1.0" encoding="utf-8"?>
+<p:sld xmlns:a="http://schemas.openxmlformats.org/drawingml/2006/main" xmlns:r="http://schemas.openxmlformats.org/officeDocument/2006/relationships" xmlns:p="http://schemas.openxmlformats.org/presentationml/2006/main">
+  <p:cSld>
+    <p:spTree>
+      <p:nvGrpSpPr>
+        <p:cNvPr id="1" name=""/>
+        <p:cNvGrpSpPr/>
+        <p:nvPr/>
+      </p:nvGrpSpPr>
+      <p:grpSpPr>
+        <a:xfrm>
+          <a:off x="0" y="0"/>
+          <a:ext cx="0" cy="0"/>
+          <a:chOff x="0" y="0"/>
+          <a:chExt cx="0" cy="0"/>
+        </a:xfrm>
+      </p:grpSpPr>
+      <p:sp>
+        <p:nvSpPr>
+          <p:cNvPr id="2" name="標題 1"/>
+          <p:cNvSpPr>
+            <a:spLocks noGrp="1"/>
+          </p:cNvSpPr>
+          <p:nvPr>
+            <p:ph type="title"/>
+          </p:nvPr>
+        </p:nvSpPr>
+        <p:spPr/>
+        <p:txBody>
+          <a:bodyPr/>
+          <a:lstStyle/>
+          <a:p>
+            <a:r>
+              <a:rPr lang="en-US" altLang="zh-TW" dirty="0"/>
+              <a:t>Run Simulation</a:t>
+            </a:r>
+            <a:r>
+              <a:rPr lang="zh-TW" altLang="en-US" dirty="0"/>
+              <a:t> </a:t>
+            </a:r>
+            <a:r>
+              <a:rPr lang="en-US" altLang="zh-TW" dirty="0"/>
+              <a:t>in </a:t>
+            </a:r>
+            <a:r>
+              <a:rPr lang="en-US" altLang="zh-TW" dirty="0" err="1"/>
+              <a:t>Vivado</a:t>
+            </a:r>
+            <a:r>
+              <a:rPr lang="en-US" altLang="zh-TW" dirty="0"/>
+              <a:t> GUI</a:t>
+            </a:r>
+            <a:endParaRPr lang="zh-TW" altLang="en-US" dirty="0"/>
+          </a:p>
+        </p:txBody>
+      </p:sp>
+      <p:sp>
+        <p:nvSpPr>
+          <p:cNvPr id="3" name="內容版面配置區 2"/>
+          <p:cNvSpPr>
+            <a:spLocks noGrp="1"/>
+          </p:cNvSpPr>
+          <p:nvPr>
+            <p:ph idx="1"/>
+          </p:nvPr>
+        </p:nvSpPr>
+        <p:spPr>
+          <a:xfrm>
+            <a:off x="838200" y="1825625"/>
+            <a:ext cx="6696808" cy="4351338"/>
+          </a:xfrm>
+        </p:spPr>
+        <p:txBody>
+          <a:bodyPr/>
+          <a:lstStyle/>
+          <a:p>
+            <a:r>
+              <a:rPr lang="en-US" altLang="zh-TW" dirty="0"/>
+              <a:t>Select which test bench you want to run in the “Simulation top module name”</a:t>
+            </a:r>
+          </a:p>
+          <a:p>
+            <a:pPr marL="0" indent="0">
+              <a:buNone/>
+            </a:pPr>
+            <a:endParaRPr lang="en-US" altLang="zh-TW" dirty="0"/>
+          </a:p>
+          <a:p>
+            <a:pPr marL="0" indent="0">
+              <a:buNone/>
+            </a:pPr>
+            <a:endParaRPr lang="en-US" altLang="zh-TW" dirty="0"/>
+          </a:p>
+          <a:p>
+            <a:endParaRPr lang="zh-TW" altLang="en-US" dirty="0"/>
+          </a:p>
+        </p:txBody>
+      </p:sp>
+      <p:pic>
+        <p:nvPicPr>
+          <p:cNvPr id="6" name="圖片 5"/>
+          <p:cNvPicPr>
+            <a:picLocks noChangeAspect="1"/>
+          </p:cNvPicPr>
+          <p:nvPr/>
+        </p:nvPicPr>
+        <p:blipFill>
+          <a:blip r:embed="rId2"/>
+          <a:stretch>
+            <a:fillRect/>
+          </a:stretch>
+        </p:blipFill>
+        <p:spPr>
+          <a:xfrm>
+            <a:off x="7717676" y="1397977"/>
+            <a:ext cx="4339124" cy="5180551"/>
+          </a:xfrm>
+          <a:prstGeom prst="rect">
+            <a:avLst/>
+          </a:prstGeom>
+        </p:spPr>
+      </p:pic>
+    </p:spTree>
+    <p:extLst>
+      <p:ext uri="{BB962C8B-B14F-4D97-AF65-F5344CB8AC3E}">
+        <p14:creationId xmlns:p14="http://schemas.microsoft.com/office/powerpoint/2010/main" val="738433254"/>
+      </p:ext>
+    </p:extLst>
+  </p:cSld>
+  <p:clrMapOvr>
+    <a:masterClrMapping/>
+  </p:clrMapOvr>
+</p:sld>
+</file>
+
+<file path=ppt/slides/slide6.xml><?xml version="1.0" encoding="utf-8"?>
+<p:sld xmlns:a="http://schemas.openxmlformats.org/drawingml/2006/main" xmlns:r="http://schemas.openxmlformats.org/officeDocument/2006/relationships" xmlns:p="http://schemas.openxmlformats.org/presentationml/2006/main">
+  <p:cSld>
+    <p:spTree>
+      <p:nvGrpSpPr>
+        <p:cNvPr id="1" name=""/>
+        <p:cNvGrpSpPr/>
+        <p:nvPr/>
+      </p:nvGrpSpPr>
+      <p:grpSpPr>
+        <a:xfrm>
+          <a:off x="0" y="0"/>
+          <a:ext cx="0" cy="0"/>
+          <a:chOff x="0" y="0"/>
+          <a:chExt cx="0" cy="0"/>
+        </a:xfrm>
+      </p:grpSpPr>
+      <p:sp>
+        <p:nvSpPr>
+          <p:cNvPr id="2" name="標題 1"/>
+          <p:cNvSpPr>
+            <a:spLocks noGrp="1"/>
+          </p:cNvSpPr>
+          <p:nvPr>
+            <p:ph type="title"/>
+          </p:nvPr>
+        </p:nvSpPr>
+        <p:spPr/>
+        <p:txBody>
+          <a:bodyPr/>
+          <a:lstStyle/>
+          <a:p>
+            <a:r>
+              <a:rPr lang="en-US" altLang="zh-TW" dirty="0"/>
+              <a:t>Run Simulation</a:t>
+            </a:r>
+            <a:r>
+              <a:rPr lang="zh-TW" altLang="en-US" dirty="0"/>
+              <a:t> </a:t>
+            </a:r>
+            <a:r>
+              <a:rPr lang="en-US" altLang="zh-TW" dirty="0"/>
+              <a:t>in </a:t>
+            </a:r>
+            <a:r>
+              <a:rPr lang="en-US" altLang="zh-TW" dirty="0" err="1"/>
+              <a:t>Vivado</a:t>
+            </a:r>
+            <a:r>
+              <a:rPr lang="en-US" altLang="zh-TW" dirty="0"/>
+              <a:t> GUI</a:t>
+            </a:r>
+            <a:endParaRPr lang="zh-TW" altLang="en-US" dirty="0"/>
+          </a:p>
+        </p:txBody>
+      </p:sp>
+      <p:sp>
+        <p:nvSpPr>
+          <p:cNvPr id="3" name="內容版面配置區 2"/>
+          <p:cNvSpPr>
+            <a:spLocks noGrp="1"/>
+          </p:cNvSpPr>
+          <p:nvPr>
+            <p:ph idx="1"/>
+          </p:nvPr>
+        </p:nvSpPr>
+        <p:spPr>
+          <a:xfrm>
+            <a:off x="838200" y="1825625"/>
+            <a:ext cx="6696808" cy="4351338"/>
+          </a:xfrm>
+        </p:spPr>
+        <p:txBody>
+          <a:bodyPr/>
+          <a:lstStyle/>
+          <a:p>
+            <a:r>
+              <a:rPr lang="en-US" altLang="zh-TW" dirty="0"/>
+              <a:t>Select which test bench you want to run in the “Simulation top module name”</a:t>
+            </a:r>
+          </a:p>
+          <a:p>
+            <a:r>
+              <a:rPr lang="en-US" altLang="zh-TW" dirty="0"/>
+              <a:t>Click “Run Behavior Simulation”</a:t>
+            </a:r>
+          </a:p>
+          <a:p>
+            <a:pPr marL="0" indent="0">
+              <a:buNone/>
+            </a:pPr>
+            <a:endParaRPr lang="en-US" altLang="zh-TW" dirty="0"/>
+          </a:p>
+          <a:p>
+            <a:pPr marL="0" indent="0">
+              <a:buNone/>
+            </a:pPr>
+            <a:endParaRPr lang="en-US" altLang="zh-TW" dirty="0"/>
+          </a:p>
+          <a:p>
+            <a:endParaRPr lang="zh-TW" altLang="en-US" dirty="0"/>
+          </a:p>
+        </p:txBody>
+      </p:sp>
+      <p:pic>
+        <p:nvPicPr>
+          <p:cNvPr id="6" name="圖片 5"/>
+          <p:cNvPicPr>
+            <a:picLocks noChangeAspect="1"/>
+          </p:cNvPicPr>
+          <p:nvPr/>
+        </p:nvPicPr>
+        <p:blipFill>
+          <a:blip r:embed="rId2"/>
+          <a:stretch>
+            <a:fillRect/>
+          </a:stretch>
+        </p:blipFill>
+        <p:spPr>
+          <a:xfrm>
+            <a:off x="7717676" y="1397977"/>
+            <a:ext cx="4339124" cy="5180551"/>
+          </a:xfrm>
+          <a:prstGeom prst="rect">
+            <a:avLst/>
+          </a:prstGeom>
+        </p:spPr>
+      </p:pic>
+      <p:pic>
+        <p:nvPicPr>
+          <p:cNvPr id="4" name="圖片 3"/>
+          <p:cNvPicPr>
+            <a:picLocks noChangeAspect="1"/>
+          </p:cNvPicPr>
+          <p:nvPr/>
+        </p:nvPicPr>
+        <p:blipFill>
+          <a:blip r:embed="rId3"/>
+          <a:stretch>
+            <a:fillRect/>
+          </a:stretch>
+        </p:blipFill>
+        <p:spPr>
+          <a:xfrm>
+            <a:off x="1089578" y="3234370"/>
+            <a:ext cx="4315427" cy="1800476"/>
+          </a:xfrm>
+          <a:prstGeom prst="rect">
+            <a:avLst/>
+          </a:prstGeom>
+        </p:spPr>
+      </p:pic>
+    </p:spTree>
+    <p:extLst>
+      <p:ext uri="{BB962C8B-B14F-4D97-AF65-F5344CB8AC3E}">
+        <p14:creationId xmlns:p14="http://schemas.microsoft.com/office/powerpoint/2010/main" val="2225677345"/>
+      </p:ext>
+    </p:extLst>
+  </p:cSld>
+  <p:clrMapOvr>
+    <a:masterClrMapping/>
+  </p:clrMapOvr>
+</p:sld>
+</file>
+
+<file path=ppt/slides/slide7.xml><?xml version="1.0" encoding="utf-8"?>
+<p:sld xmlns:a="http://schemas.openxmlformats.org/drawingml/2006/main" xmlns:r="http://schemas.openxmlformats.org/officeDocument/2006/relationships" xmlns:p="http://schemas.openxmlformats.org/presentationml/2006/main">
+  <p:cSld>
+    <p:spTree>
+      <p:nvGrpSpPr>
+        <p:cNvPr id="1" name=""/>
+        <p:cNvGrpSpPr/>
+        <p:nvPr/>
+      </p:nvGrpSpPr>
+      <p:grpSpPr>
+        <a:xfrm>
+          <a:off x="0" y="0"/>
+          <a:ext cx="0" cy="0"/>
+          <a:chOff x="0" y="0"/>
+          <a:chExt cx="0" cy="0"/>
+        </a:xfrm>
+      </p:grpSpPr>
+      <p:sp>
+        <p:nvSpPr>
+          <p:cNvPr id="2" name="標題 1"/>
+          <p:cNvSpPr>
+            <a:spLocks noGrp="1"/>
+          </p:cNvSpPr>
+          <p:nvPr>
+            <p:ph type="title"/>
+          </p:nvPr>
+        </p:nvSpPr>
+        <p:spPr/>
+        <p:txBody>
+          <a:bodyPr/>
+          <a:lstStyle/>
+          <a:p>
+            <a:r>
+              <a:rPr lang="en-US" altLang="zh-TW" dirty="0"/>
+              <a:t>Run Simulation</a:t>
+            </a:r>
+            <a:r>
+              <a:rPr lang="zh-TW" altLang="en-US" dirty="0"/>
+              <a:t> </a:t>
+            </a:r>
+            <a:r>
+              <a:rPr lang="en-US" altLang="zh-TW" dirty="0"/>
+              <a:t>in </a:t>
+            </a:r>
+            <a:r>
+              <a:rPr lang="en-US" altLang="zh-TW" dirty="0" err="1"/>
+              <a:t>Vivado</a:t>
+            </a:r>
+            <a:r>
+              <a:rPr lang="en-US" altLang="zh-TW" dirty="0"/>
+              <a:t> GUI</a:t>
+            </a:r>
+            <a:endParaRPr lang="zh-TW" altLang="en-US" dirty="0"/>
+          </a:p>
+        </p:txBody>
+      </p:sp>
+      <p:sp>
+        <p:nvSpPr>
+          <p:cNvPr id="3" name="內容版面配置區 2"/>
+          <p:cNvSpPr>
+            <a:spLocks noGrp="1"/>
+          </p:cNvSpPr>
+          <p:nvPr>
+            <p:ph idx="1"/>
+          </p:nvPr>
+        </p:nvSpPr>
+        <p:spPr>
+          <a:xfrm>
+            <a:off x="838200" y="1825625"/>
+            <a:ext cx="3462160" cy="4351338"/>
+          </a:xfrm>
+        </p:spPr>
+        <p:txBody>
+          <a:bodyPr/>
+          <a:lstStyle/>
+          <a:p>
+            <a:r>
+              <a:rPr lang="en-US" altLang="zh-TW" dirty="0"/>
+              <a:t>Click the “Run All” button to run the </a:t>
+            </a:r>
+            <a:r>
+              <a:rPr lang="en-US" altLang="zh-TW" dirty="0" err="1"/>
+              <a:t>testbench</a:t>
+            </a:r>
+            <a:r>
+              <a:rPr lang="en-US" altLang="zh-TW" dirty="0"/>
+              <a:t> and monitor the waveform</a:t>
+            </a:r>
+          </a:p>
+          <a:p>
+            <a:pPr marL="0" indent="0">
+              <a:buNone/>
+            </a:pPr>
+            <a:endParaRPr lang="en-US" altLang="zh-TW" dirty="0"/>
+          </a:p>
+          <a:p>
+            <a:endParaRPr lang="zh-TW" altLang="en-US" dirty="0"/>
+          </a:p>
+        </p:txBody>
+      </p:sp>
+      <p:pic>
+        <p:nvPicPr>
+          <p:cNvPr id="5" name="圖片 4"/>
+          <p:cNvPicPr>
+            <a:picLocks noChangeAspect="1"/>
+          </p:cNvPicPr>
+          <p:nvPr/>
+        </p:nvPicPr>
+        <p:blipFill>
+          <a:blip r:embed="rId2"/>
+          <a:stretch>
+            <a:fillRect/>
+          </a:stretch>
+        </p:blipFill>
+        <p:spPr>
+          <a:xfrm>
+            <a:off x="4300360" y="1459523"/>
+            <a:ext cx="7891640" cy="4260228"/>
+          </a:xfrm>
+          <a:prstGeom prst="rect">
+            <a:avLst/>
+          </a:prstGeom>
+        </p:spPr>
+      </p:pic>
+    </p:spTree>
+    <p:extLst>
+      <p:ext uri="{BB962C8B-B14F-4D97-AF65-F5344CB8AC3E}">
+        <p14:creationId xmlns:p14="http://schemas.microsoft.com/office/powerpoint/2010/main" val="1136901963"/>
+      </p:ext>
+    </p:extLst>
+  </p:cSld>
+  <p:clrMapOvr>
+    <a:masterClrMapping/>
+  </p:clrMapOvr>
+</p:sld>
+</file>
+
+<file path=ppt/slides/slide8.xml><?xml version="1.0" encoding="utf-8"?>
+<p:sld xmlns:a="http://schemas.openxmlformats.org/drawingml/2006/main" xmlns:r="http://schemas.openxmlformats.org/officeDocument/2006/relationships" xmlns:p="http://schemas.openxmlformats.org/presentationml/2006/main">
+  <p:cSld>
+    <p:spTree>
+      <p:nvGrpSpPr>
+        <p:cNvPr id="1" name=""/>
+        <p:cNvGrpSpPr/>
+        <p:nvPr/>
+      </p:nvGrpSpPr>
+      <p:grpSpPr>
+        <a:xfrm>
+          <a:off x="0" y="0"/>
+          <a:ext cx="0" cy="0"/>
+          <a:chOff x="0" y="0"/>
+          <a:chExt cx="0" cy="0"/>
+        </a:xfrm>
+      </p:grpSpPr>
+      <p:sp>
+        <p:nvSpPr>
+          <p:cNvPr id="2" name="標題 1"/>
+          <p:cNvSpPr>
+            <a:spLocks noGrp="1"/>
+          </p:cNvSpPr>
+          <p:nvPr>
+            <p:ph type="title"/>
+          </p:nvPr>
+        </p:nvSpPr>
+        <p:spPr/>
+        <p:txBody>
+          <a:bodyPr>
+            <a:normAutofit/>
+          </a:bodyPr>
+          <a:lstStyle/>
+          <a:p>
+            <a:r>
+              <a:rPr lang="en-US" altLang="zh-TW" dirty="0" err="1"/>
+              <a:t>JuypterNotebook</a:t>
+            </a:r>
+            <a:r>
+              <a:rPr lang="en-US" altLang="zh-TW" dirty="0"/>
+              <a:t>: caravel_fpga.ipynb</a:t>
+            </a:r>
+            <a:endParaRPr lang="zh-TW" altLang="en-US" dirty="0"/>
+          </a:p>
+        </p:txBody>
+      </p:sp>
+      <p:sp>
+        <p:nvSpPr>
+          <p:cNvPr id="3" name="內容版面配置區 2"/>
+          <p:cNvSpPr>
+            <a:spLocks noGrp="1"/>
+          </p:cNvSpPr>
+          <p:nvPr>
+            <p:ph idx="1"/>
+          </p:nvPr>
+        </p:nvSpPr>
+        <p:spPr/>
+        <p:txBody>
+          <a:bodyPr>
+            <a:normAutofit fontScale="92500" lnSpcReduction="20000"/>
+          </a:bodyPr>
+          <a:lstStyle/>
+          <a:p>
+            <a:r>
+              <a:rPr lang="en-US" altLang="zh-TW" dirty="0"/>
+              <a:t>Select one firmware binary to load into BRAM as SPIROM data</a:t>
+            </a:r>
+          </a:p>
+          <a:p>
+            <a:pPr lvl="1"/>
+            <a:r>
+              <a:rPr lang="en-US" altLang="zh-TW" dirty="0" err="1"/>
+              <a:t>fiROM</a:t>
+            </a:r>
+            <a:r>
+              <a:rPr lang="en-US" altLang="zh-TW" dirty="0"/>
+              <a:t> = open("</a:t>
+            </a:r>
+            <a:r>
+              <a:rPr lang="en-US" altLang="zh-TW" dirty="0" err="1">
+                <a:solidFill>
+                  <a:srgbClr val="FF0000"/>
+                </a:solidFill>
+              </a:rPr>
+              <a:t>counter_wb.hex</a:t>
+            </a:r>
+            <a:r>
+              <a:rPr lang="en-US" altLang="zh-TW" dirty="0"/>
+              <a:t>", "r+") or</a:t>
+            </a:r>
+          </a:p>
+          <a:p>
+            <a:pPr lvl="1"/>
+            <a:r>
+              <a:rPr lang="en-US" altLang="zh-TW" dirty="0" err="1"/>
+              <a:t>fiROM</a:t>
+            </a:r>
+            <a:r>
+              <a:rPr lang="en-US" altLang="zh-TW" dirty="0"/>
+              <a:t> = open("</a:t>
+            </a:r>
+            <a:r>
+              <a:rPr lang="en-US" altLang="zh-TW" dirty="0" err="1">
+                <a:solidFill>
+                  <a:srgbClr val="FF0000"/>
+                </a:solidFill>
+              </a:rPr>
+              <a:t>counter_la.hex</a:t>
+            </a:r>
+            <a:r>
+              <a:rPr lang="en-US" altLang="zh-TW" dirty="0"/>
+              <a:t>", "r+") or</a:t>
+            </a:r>
+          </a:p>
+          <a:p>
+            <a:pPr lvl="1"/>
+            <a:r>
+              <a:rPr lang="en-US" altLang="zh-TW" dirty="0" err="1"/>
+              <a:t>fiROM</a:t>
+            </a:r>
+            <a:r>
+              <a:rPr lang="en-US" altLang="zh-TW" dirty="0"/>
+              <a:t> = open(“</a:t>
+            </a:r>
+            <a:r>
+              <a:rPr lang="en-US" altLang="zh-TW" dirty="0" err="1">
+                <a:solidFill>
+                  <a:srgbClr val="FF0000"/>
+                </a:solidFill>
+              </a:rPr>
+              <a:t>gcd_la.hex</a:t>
+            </a:r>
+            <a:r>
+              <a:rPr lang="en-US" altLang="zh-TW" dirty="0"/>
+              <a:t>", "r+") or</a:t>
+            </a:r>
+          </a:p>
+          <a:p>
+            <a:r>
+              <a:rPr lang="en-US" altLang="zh-TW" dirty="0"/>
+              <a:t>Release reset to make Caravel-</a:t>
+            </a:r>
+            <a:r>
+              <a:rPr lang="en-US" altLang="zh-TW" dirty="0" err="1"/>
+              <a:t>soc</a:t>
+            </a:r>
+            <a:r>
+              <a:rPr lang="en-US" altLang="zh-TW" dirty="0"/>
+              <a:t> start execute firmware code</a:t>
+            </a:r>
+          </a:p>
+          <a:p>
+            <a:pPr lvl="1"/>
+            <a:r>
+              <a:rPr lang="en-US" altLang="zh-TW" dirty="0" err="1"/>
+              <a:t>ipOUTPIN.write</a:t>
+            </a:r>
+            <a:r>
+              <a:rPr lang="en-US" altLang="zh-TW" dirty="0"/>
+              <a:t>(0x10, 1)</a:t>
+            </a:r>
+          </a:p>
+          <a:p>
+            <a:pPr marL="457200" lvl="1" indent="0">
+              <a:buNone/>
+            </a:pPr>
+            <a:r>
+              <a:rPr lang="en-US" altLang="zh-TW" dirty="0"/>
+              <a:t>Note: If you want to load different firmware binary without restart FPGA, you need to assert &amp; release reset signal for the caravel-</a:t>
+            </a:r>
+            <a:r>
+              <a:rPr lang="en-US" altLang="zh-TW" dirty="0" err="1"/>
+              <a:t>soc</a:t>
+            </a:r>
+            <a:r>
+              <a:rPr lang="en-US" altLang="zh-TW" dirty="0"/>
+              <a:t> to make CPU execute new firmware.</a:t>
+            </a:r>
+          </a:p>
+          <a:p>
+            <a:pPr marL="914400" lvl="1" indent="-457200">
+              <a:buAutoNum type="arabicPeriod"/>
+            </a:pPr>
+            <a:r>
+              <a:rPr lang="en-US" altLang="zh-TW" dirty="0"/>
+              <a:t>Load </a:t>
+            </a:r>
+            <a:r>
+              <a:rPr lang="en-US" altLang="zh-TW" dirty="0" err="1"/>
+              <a:t>counter_wb.hex</a:t>
+            </a:r>
+            <a:endParaRPr lang="en-US" altLang="zh-TW" dirty="0"/>
+          </a:p>
+          <a:p>
+            <a:pPr marL="914400" lvl="1" indent="-457200">
+              <a:buAutoNum type="arabicPeriod"/>
+            </a:pPr>
+            <a:r>
+              <a:rPr lang="en-US" altLang="zh-TW" dirty="0"/>
+              <a:t>Release reset by </a:t>
+            </a:r>
+            <a:r>
+              <a:rPr lang="en-US" altLang="zh-TW" dirty="0" err="1"/>
+              <a:t>ipOUTPIN.write</a:t>
+            </a:r>
+            <a:r>
+              <a:rPr lang="en-US" altLang="zh-TW" dirty="0"/>
+              <a:t>(0x10, </a:t>
+            </a:r>
+            <a:r>
+              <a:rPr lang="en-US" altLang="zh-TW" dirty="0">
+                <a:solidFill>
+                  <a:srgbClr val="FF0000"/>
+                </a:solidFill>
+              </a:rPr>
+              <a:t>1</a:t>
+            </a:r>
+            <a:r>
+              <a:rPr lang="en-US" altLang="zh-TW" dirty="0"/>
+              <a:t>), check </a:t>
+            </a:r>
+            <a:r>
+              <a:rPr lang="en-US" altLang="zh-TW" dirty="0" err="1"/>
+              <a:t>mprj_i</a:t>
+            </a:r>
+            <a:r>
+              <a:rPr lang="en-US" altLang="zh-TW" dirty="0"/>
+              <a:t>/o/</a:t>
+            </a:r>
+            <a:r>
+              <a:rPr lang="en-US" altLang="zh-TW" dirty="0" err="1"/>
+              <a:t>en</a:t>
+            </a:r>
+            <a:endParaRPr lang="en-US" altLang="zh-TW" dirty="0"/>
+          </a:p>
+          <a:p>
+            <a:pPr marL="914400" lvl="1" indent="-457200">
+              <a:buAutoNum type="arabicPeriod"/>
+            </a:pPr>
+            <a:r>
+              <a:rPr lang="en-US" altLang="zh-TW" dirty="0"/>
+              <a:t>Load </a:t>
+            </a:r>
+            <a:r>
+              <a:rPr lang="en-US" altLang="zh-TW" dirty="0" err="1"/>
+              <a:t>counter_la.hex</a:t>
+            </a:r>
+            <a:endParaRPr lang="en-US" altLang="zh-TW" dirty="0"/>
+          </a:p>
+          <a:p>
+            <a:pPr marL="914400" lvl="1" indent="-457200">
+              <a:buFont typeface="Arial" panose="020B0604020202020204" pitchFamily="34" charset="0"/>
+              <a:buAutoNum type="arabicPeriod"/>
+            </a:pPr>
+            <a:r>
+              <a:rPr lang="en-US" altLang="zh-TW" dirty="0"/>
+              <a:t>Assert reset by </a:t>
+            </a:r>
+            <a:r>
+              <a:rPr lang="en-US" altLang="zh-TW" dirty="0" err="1"/>
+              <a:t>ipOUTPIN.write</a:t>
+            </a:r>
+            <a:r>
+              <a:rPr lang="en-US" altLang="zh-TW" dirty="0"/>
+              <a:t>(0x10, </a:t>
+            </a:r>
+            <a:r>
+              <a:rPr lang="en-US" altLang="zh-TW" dirty="0">
+                <a:solidFill>
+                  <a:srgbClr val="FF0000"/>
+                </a:solidFill>
+              </a:rPr>
+              <a:t>0</a:t>
+            </a:r>
+            <a:r>
+              <a:rPr lang="en-US" altLang="zh-TW" dirty="0"/>
+              <a:t>)</a:t>
+            </a:r>
+          </a:p>
+          <a:p>
+            <a:pPr marL="914400" lvl="1" indent="-457200">
+              <a:buFont typeface="Arial" panose="020B0604020202020204" pitchFamily="34" charset="0"/>
+              <a:buAutoNum type="arabicPeriod"/>
+            </a:pPr>
+            <a:r>
+              <a:rPr lang="en-US" altLang="zh-TW" dirty="0"/>
+              <a:t>Release reset by </a:t>
+            </a:r>
+            <a:r>
+              <a:rPr lang="en-US" altLang="zh-TW" dirty="0" err="1"/>
+              <a:t>ipOUTPIN.write</a:t>
+            </a:r>
+            <a:r>
+              <a:rPr lang="en-US" altLang="zh-TW" dirty="0"/>
+              <a:t>(0x10, </a:t>
+            </a:r>
+            <a:r>
+              <a:rPr lang="en-US" altLang="zh-TW" dirty="0">
+                <a:solidFill>
+                  <a:srgbClr val="FF0000"/>
+                </a:solidFill>
+              </a:rPr>
+              <a:t>1</a:t>
+            </a:r>
+            <a:r>
+              <a:rPr lang="en-US" altLang="zh-TW" dirty="0"/>
+              <a:t>), check </a:t>
+            </a:r>
+            <a:r>
+              <a:rPr lang="en-US" altLang="zh-TW" dirty="0" err="1"/>
+              <a:t>mprj_i</a:t>
+            </a:r>
+            <a:r>
+              <a:rPr lang="en-US" altLang="zh-TW" dirty="0"/>
+              <a:t>/o/</a:t>
+            </a:r>
+            <a:r>
+              <a:rPr lang="en-US" altLang="zh-TW" dirty="0" err="1"/>
+              <a:t>en</a:t>
+            </a:r>
+            <a:endParaRPr lang="en-US" altLang="zh-TW" dirty="0"/>
+          </a:p>
+          <a:p>
+            <a:pPr marL="914400" lvl="1" indent="-457200">
+              <a:buFont typeface="Arial" panose="020B0604020202020204" pitchFamily="34" charset="0"/>
+              <a:buAutoNum type="arabicPeriod"/>
+            </a:pPr>
+            <a:endParaRPr lang="en-US" altLang="zh-TW" dirty="0"/>
+          </a:p>
+          <a:p>
+            <a:pPr marL="914400" lvl="1" indent="-457200">
+              <a:buAutoNum type="arabicPeriod"/>
+            </a:pPr>
+            <a:endParaRPr lang="zh-TW" altLang="en-US" dirty="0"/>
+          </a:p>
+        </p:txBody>
+      </p:sp>
+    </p:spTree>
+    <p:extLst>
+      <p:ext uri="{BB962C8B-B14F-4D97-AF65-F5344CB8AC3E}">
+        <p14:creationId xmlns:p14="http://schemas.microsoft.com/office/powerpoint/2010/main" val="1847216346"/>
       </p:ext>
     </p:extLst>
   </p:cSld>

</xml_diff>